<commit_message>
final presentation final upload
</commit_message>
<xml_diff>
--- a/Cardiovascular Mortality Presentation CJK slides.pptx
+++ b/Cardiovascular Mortality Presentation CJK slides.pptx
@@ -5,7 +5,7 @@
     <p:sldMasterId id="2147483648" r:id="rId1"/>
   </p:sldMasterIdLst>
   <p:notesMasterIdLst>
-    <p:notesMasterId r:id="rId11"/>
+    <p:notesMasterId r:id="rId15"/>
   </p:notesMasterIdLst>
   <p:sldIdLst>
     <p:sldId id="259" r:id="rId2"/>
@@ -17,6 +17,10 @@
     <p:sldId id="582" r:id="rId8"/>
     <p:sldId id="583" r:id="rId9"/>
     <p:sldId id="586" r:id="rId10"/>
+    <p:sldId id="587" r:id="rId11"/>
+    <p:sldId id="584" r:id="rId12"/>
+    <p:sldId id="588" r:id="rId13"/>
+    <p:sldId id="589" r:id="rId14"/>
   </p:sldIdLst>
   <p:sldSz cx="12192000" cy="6858000"/>
   <p:notesSz cx="6858000" cy="9144000"/>
@@ -470,6 +474,205 @@
     </a:lvl9pPr>
   </p:notesStyle>
 </p:notesMaster>
+</file>
+
+<file path=ppt/notesSlides/notesSlide1.xml><?xml version="1.0" encoding="utf-8"?>
+<p:notes xmlns:a="http://schemas.openxmlformats.org/drawingml/2006/main" xmlns:r="http://schemas.openxmlformats.org/officeDocument/2006/relationships" xmlns:p="http://schemas.openxmlformats.org/presentationml/2006/main">
+  <p:cSld>
+    <p:spTree>
+      <p:nvGrpSpPr>
+        <p:cNvPr id="1" name=""/>
+        <p:cNvGrpSpPr/>
+        <p:nvPr/>
+      </p:nvGrpSpPr>
+      <p:grpSpPr>
+        <a:xfrm>
+          <a:off x="0" y="0"/>
+          <a:ext cx="0" cy="0"/>
+          <a:chOff x="0" y="0"/>
+          <a:chExt cx="0" cy="0"/>
+        </a:xfrm>
+      </p:grpSpPr>
+      <p:sp>
+        <p:nvSpPr>
+          <p:cNvPr id="2" name="Slide Image Placeholder 1"/>
+          <p:cNvSpPr>
+            <a:spLocks noGrp="1" noRot="1" noChangeAspect="1"/>
+          </p:cNvSpPr>
+          <p:nvPr>
+            <p:ph type="sldImg"/>
+          </p:nvPr>
+        </p:nvSpPr>
+        <p:spPr/>
+      </p:sp>
+      <p:sp>
+        <p:nvSpPr>
+          <p:cNvPr id="3" name="Notes Placeholder 2"/>
+          <p:cNvSpPr>
+            <a:spLocks noGrp="1"/>
+          </p:cNvSpPr>
+          <p:nvPr>
+            <p:ph type="body" idx="1"/>
+          </p:nvPr>
+        </p:nvSpPr>
+        <p:spPr/>
+        <p:txBody>
+          <a:bodyPr/>
+          <a:lstStyle/>
+          <a:p>
+            <a:r>
+              <a:rPr lang="en-US" dirty="0"/>
+              <a:t>Perils of overfitting</a:t>
+            </a:r>
+          </a:p>
+        </p:txBody>
+      </p:sp>
+      <p:sp>
+        <p:nvSpPr>
+          <p:cNvPr id="4" name="Slide Number Placeholder 3"/>
+          <p:cNvSpPr>
+            <a:spLocks noGrp="1"/>
+          </p:cNvSpPr>
+          <p:nvPr>
+            <p:ph type="sldNum" sz="quarter" idx="5"/>
+          </p:nvPr>
+        </p:nvSpPr>
+        <p:spPr/>
+        <p:txBody>
+          <a:bodyPr/>
+          <a:lstStyle/>
+          <a:p>
+            <a:fld id="{C87C959E-7756-4F15-A022-A9DAD637AB3B}" type="slidenum">
+              <a:rPr lang="en-US" smtClean="0"/>
+              <a:t>12</a:t>
+            </a:fld>
+            <a:endParaRPr lang="en-US"/>
+          </a:p>
+        </p:txBody>
+      </p:sp>
+    </p:spTree>
+    <p:extLst>
+      <p:ext uri="{BB962C8B-B14F-4D97-AF65-F5344CB8AC3E}">
+        <p14:creationId xmlns:p14="http://schemas.microsoft.com/office/powerpoint/2010/main" val="460399571"/>
+      </p:ext>
+    </p:extLst>
+  </p:cSld>
+  <p:clrMapOvr>
+    <a:masterClrMapping/>
+  </p:clrMapOvr>
+</p:notes>
+</file>
+
+<file path=ppt/notesSlides/notesSlide2.xml><?xml version="1.0" encoding="utf-8"?>
+<p:notes xmlns:a="http://schemas.openxmlformats.org/drawingml/2006/main" xmlns:r="http://schemas.openxmlformats.org/officeDocument/2006/relationships" xmlns:p="http://schemas.openxmlformats.org/presentationml/2006/main">
+  <p:cSld>
+    <p:spTree>
+      <p:nvGrpSpPr>
+        <p:cNvPr id="1" name=""/>
+        <p:cNvGrpSpPr/>
+        <p:nvPr/>
+      </p:nvGrpSpPr>
+      <p:grpSpPr>
+        <a:xfrm>
+          <a:off x="0" y="0"/>
+          <a:ext cx="0" cy="0"/>
+          <a:chOff x="0" y="0"/>
+          <a:chExt cx="0" cy="0"/>
+        </a:xfrm>
+      </p:grpSpPr>
+      <p:sp>
+        <p:nvSpPr>
+          <p:cNvPr id="2" name="Slide Image Placeholder 1"/>
+          <p:cNvSpPr>
+            <a:spLocks noGrp="1" noRot="1" noChangeAspect="1"/>
+          </p:cNvSpPr>
+          <p:nvPr>
+            <p:ph type="sldImg"/>
+          </p:nvPr>
+        </p:nvSpPr>
+        <p:spPr/>
+      </p:sp>
+      <p:sp>
+        <p:nvSpPr>
+          <p:cNvPr id="3" name="Notes Placeholder 2"/>
+          <p:cNvSpPr>
+            <a:spLocks noGrp="1"/>
+          </p:cNvSpPr>
+          <p:nvPr>
+            <p:ph type="body" idx="1"/>
+          </p:nvPr>
+        </p:nvSpPr>
+        <p:spPr/>
+        <p:txBody>
+          <a:bodyPr/>
+          <a:lstStyle/>
+          <a:p>
+            <a:r>
+              <a:rPr lang="en-US" dirty="0"/>
+              <a:t>Remove smoking and education – R</a:t>
+            </a:r>
+            <a:r>
+              <a:rPr lang="en-US" baseline="30000" dirty="0"/>
+              <a:t>2</a:t>
+            </a:r>
+            <a:r>
+              <a:rPr lang="en-US" baseline="0" dirty="0"/>
+              <a:t> 0.67, MSE 0.29</a:t>
+            </a:r>
+          </a:p>
+          <a:p>
+            <a:endParaRPr lang="en-US" baseline="0" dirty="0"/>
+          </a:p>
+          <a:p>
+            <a:r>
+              <a:rPr lang="en-US" dirty="0"/>
+              <a:t>Remove smoking, MYS, education – R</a:t>
+            </a:r>
+            <a:r>
+              <a:rPr lang="en-US" baseline="30000" dirty="0"/>
+              <a:t>2</a:t>
+            </a:r>
+            <a:r>
+              <a:rPr lang="en-US" baseline="0" dirty="0"/>
+              <a:t> 0.66, MSE 0.30</a:t>
+            </a:r>
+          </a:p>
+        </p:txBody>
+      </p:sp>
+      <p:sp>
+        <p:nvSpPr>
+          <p:cNvPr id="4" name="Slide Number Placeholder 3"/>
+          <p:cNvSpPr>
+            <a:spLocks noGrp="1"/>
+          </p:cNvSpPr>
+          <p:nvPr>
+            <p:ph type="sldNum" sz="quarter" idx="5"/>
+          </p:nvPr>
+        </p:nvSpPr>
+        <p:spPr/>
+        <p:txBody>
+          <a:bodyPr/>
+          <a:lstStyle/>
+          <a:p>
+            <a:fld id="{C87C959E-7756-4F15-A022-A9DAD637AB3B}" type="slidenum">
+              <a:rPr lang="en-US" smtClean="0"/>
+              <a:t>13</a:t>
+            </a:fld>
+            <a:endParaRPr lang="en-US"/>
+          </a:p>
+        </p:txBody>
+      </p:sp>
+    </p:spTree>
+    <p:extLst>
+      <p:ext uri="{BB962C8B-B14F-4D97-AF65-F5344CB8AC3E}">
+        <p14:creationId xmlns:p14="http://schemas.microsoft.com/office/powerpoint/2010/main" val="777298855"/>
+      </p:ext>
+    </p:extLst>
+  </p:cSld>
+  <p:clrMapOvr>
+    <a:masterClrMapping/>
+  </p:clrMapOvr>
+</p:notes>
 </file>
 
 <file path=ppt/slideLayouts/slideLayout1.xml><?xml version="1.0" encoding="utf-8"?>
@@ -4081,6 +4284,1915 @@
 </p:sld>
 </file>
 
+<file path=ppt/slides/slide10.xml><?xml version="1.0" encoding="utf-8"?>
+<p:sld xmlns:a="http://schemas.openxmlformats.org/drawingml/2006/main" xmlns:r="http://schemas.openxmlformats.org/officeDocument/2006/relationships" xmlns:p="http://schemas.openxmlformats.org/presentationml/2006/main">
+  <p:cSld>
+    <p:spTree>
+      <p:nvGrpSpPr>
+        <p:cNvPr id="1" name=""/>
+        <p:cNvGrpSpPr/>
+        <p:nvPr/>
+      </p:nvGrpSpPr>
+      <p:grpSpPr>
+        <a:xfrm>
+          <a:off x="0" y="0"/>
+          <a:ext cx="0" cy="0"/>
+          <a:chOff x="0" y="0"/>
+          <a:chExt cx="0" cy="0"/>
+        </a:xfrm>
+      </p:grpSpPr>
+      <p:sp>
+        <p:nvSpPr>
+          <p:cNvPr id="27" name="Rectangle 9">
+            <a:extLst>
+              <a:ext uri="{FF2B5EF4-FFF2-40B4-BE49-F238E27FC236}">
+                <a16:creationId xmlns:a16="http://schemas.microsoft.com/office/drawing/2014/main" id="{8D70B121-56F4-4848-B38B-182089D909FA}"/>
+              </a:ext>
+              <a:ext uri="{C183D7F6-B498-43B3-948B-1728B52AA6E4}">
+                <adec:decorative xmlns:adec="http://schemas.microsoft.com/office/drawing/2017/decorative" val="1"/>
+              </a:ext>
+            </a:extLst>
+          </p:cNvPr>
+          <p:cNvSpPr>
+            <a:spLocks noGrp="1" noRot="1" noChangeAspect="1" noMove="1" noResize="1" noEditPoints="1" noAdjustHandles="1" noChangeArrowheads="1" noChangeShapeType="1" noTextEdit="1"/>
+          </p:cNvSpPr>
+          <p:nvPr>
+            <p:extLst>
+              <p:ext uri="{386F3935-93C4-4BCD-93E2-E3B085C9AB24}">
+                <p16:designElem xmlns:p16="http://schemas.microsoft.com/office/powerpoint/2015/main" val="1"/>
+              </p:ext>
+            </p:extLst>
+          </p:nvPr>
+        </p:nvSpPr>
+        <p:spPr bwMode="ltGray">
+          <a:xfrm>
+            <a:off x="321564" y="320040"/>
+            <a:ext cx="11548872" cy="6217920"/>
+          </a:xfrm>
+          <a:prstGeom prst="rect">
+            <a:avLst/>
+          </a:prstGeom>
+          <a:solidFill>
+            <a:schemeClr val="tx1">
+              <a:alpha val="8000"/>
+            </a:schemeClr>
+          </a:solidFill>
+          <a:ln w="127000" cap="sq" cmpd="thinThick">
+            <a:noFill/>
+          </a:ln>
+        </p:spPr>
+        <p:style>
+          <a:lnRef idx="2">
+            <a:schemeClr val="accent1">
+              <a:shade val="50000"/>
+            </a:schemeClr>
+          </a:lnRef>
+          <a:fillRef idx="1">
+            <a:schemeClr val="accent1"/>
+          </a:fillRef>
+          <a:effectRef idx="0">
+            <a:schemeClr val="accent1"/>
+          </a:effectRef>
+          <a:fontRef idx="minor">
+            <a:schemeClr val="lt1"/>
+          </a:fontRef>
+        </p:style>
+        <p:txBody>
+          <a:bodyPr rtlCol="0" anchor="ctr"/>
+          <a:lstStyle/>
+          <a:p>
+            <a:pPr algn="ctr"/>
+            <a:endParaRPr lang="en-US"/>
+          </a:p>
+        </p:txBody>
+      </p:sp>
+      <p:sp>
+        <p:nvSpPr>
+          <p:cNvPr id="4" name="Title 3">
+            <a:extLst>
+              <a:ext uri="{FF2B5EF4-FFF2-40B4-BE49-F238E27FC236}">
+                <a16:creationId xmlns:a16="http://schemas.microsoft.com/office/drawing/2014/main" id="{9860BD11-FBA7-4C2B-B8D3-9608DBCCD7F3}"/>
+              </a:ext>
+            </a:extLst>
+          </p:cNvPr>
+          <p:cNvSpPr>
+            <a:spLocks noGrp="1"/>
+          </p:cNvSpPr>
+          <p:nvPr>
+            <p:ph type="title"/>
+          </p:nvPr>
+        </p:nvSpPr>
+        <p:spPr>
+          <a:xfrm>
+            <a:off x="537328" y="963877"/>
+            <a:ext cx="3795234" cy="4930246"/>
+          </a:xfrm>
+        </p:spPr>
+        <p:txBody>
+          <a:bodyPr>
+            <a:normAutofit/>
+          </a:bodyPr>
+          <a:lstStyle/>
+          <a:p>
+            <a:pPr algn="r"/>
+            <a:r>
+              <a:rPr lang="en-US" dirty="0">
+                <a:solidFill>
+                  <a:schemeClr val="accent1"/>
+                </a:solidFill>
+              </a:rPr>
+              <a:t>Multiple Linear Regression – Factors Used in Comprehensive Model</a:t>
+            </a:r>
+          </a:p>
+        </p:txBody>
+      </p:sp>
+      <p:cxnSp>
+        <p:nvCxnSpPr>
+          <p:cNvPr id="28" name="Straight Connector 11">
+            <a:extLst>
+              <a:ext uri="{FF2B5EF4-FFF2-40B4-BE49-F238E27FC236}">
+                <a16:creationId xmlns:a16="http://schemas.microsoft.com/office/drawing/2014/main" id="{2D72A2C9-F3CA-4216-8BAD-FA4C970C3C4E}"/>
+              </a:ext>
+              <a:ext uri="{C183D7F6-B498-43B3-948B-1728B52AA6E4}">
+                <adec:decorative xmlns:adec="http://schemas.microsoft.com/office/drawing/2017/decorative" val="1"/>
+              </a:ext>
+            </a:extLst>
+          </p:cNvPr>
+          <p:cNvCxnSpPr>
+            <a:cxnSpLocks noGrp="1" noRot="1" noChangeAspect="1" noMove="1" noResize="1" noEditPoints="1" noAdjustHandles="1" noChangeArrowheads="1" noChangeShapeType="1"/>
+          </p:cNvCxnSpPr>
+          <p:nvPr>
+            <p:extLst>
+              <p:ext uri="{386F3935-93C4-4BCD-93E2-E3B085C9AB24}">
+                <p16:designElem xmlns:p16="http://schemas.microsoft.com/office/powerpoint/2015/main" val="1"/>
+              </p:ext>
+            </p:extLst>
+          </p:nvPr>
+        </p:nvCxnSpPr>
+        <p:spPr>
+          <a:xfrm>
+            <a:off x="4654296" y="2057400"/>
+            <a:ext cx="0" cy="2743200"/>
+          </a:xfrm>
+          <a:prstGeom prst="line">
+            <a:avLst/>
+          </a:prstGeom>
+          <a:ln w="19050">
+            <a:solidFill>
+              <a:schemeClr val="tx1">
+                <a:lumMod val="85000"/>
+                <a:lumOff val="15000"/>
+              </a:schemeClr>
+            </a:solidFill>
+          </a:ln>
+        </p:spPr>
+        <p:style>
+          <a:lnRef idx="1">
+            <a:schemeClr val="accent1"/>
+          </a:lnRef>
+          <a:fillRef idx="0">
+            <a:schemeClr val="accent1"/>
+          </a:fillRef>
+          <a:effectRef idx="0">
+            <a:schemeClr val="accent1"/>
+          </a:effectRef>
+          <a:fontRef idx="minor">
+            <a:schemeClr val="tx1"/>
+          </a:fontRef>
+        </p:style>
+      </p:cxnSp>
+      <p:graphicFrame>
+        <p:nvGraphicFramePr>
+          <p:cNvPr id="3" name="Table 2">
+            <a:extLst>
+              <a:ext uri="{FF2B5EF4-FFF2-40B4-BE49-F238E27FC236}">
+                <a16:creationId xmlns:a16="http://schemas.microsoft.com/office/drawing/2014/main" id="{A8820674-9B58-4623-915D-2777E86FBC79}"/>
+              </a:ext>
+            </a:extLst>
+          </p:cNvPr>
+          <p:cNvGraphicFramePr>
+            <a:graphicFrameLocks noGrp="1"/>
+          </p:cNvGraphicFramePr>
+          <p:nvPr>
+            <p:extLst/>
+          </p:nvPr>
+        </p:nvGraphicFramePr>
+        <p:xfrm>
+          <a:off x="5235228" y="2283314"/>
+          <a:ext cx="5557952" cy="3610809"/>
+        </p:xfrm>
+        <a:graphic>
+          <a:graphicData uri="http://schemas.openxmlformats.org/drawingml/2006/table">
+            <a:tbl>
+              <a:tblPr>
+                <a:tableStyleId>{5C22544A-7EE6-4342-B048-85BDC9FD1C3A}</a:tableStyleId>
+              </a:tblPr>
+              <a:tblGrid>
+                <a:gridCol w="5557952">
+                  <a:extLst>
+                    <a:ext uri="{9D8B030D-6E8A-4147-A177-3AD203B41FA5}">
+                      <a16:colId xmlns:a16="http://schemas.microsoft.com/office/drawing/2014/main" val="3018804841"/>
+                    </a:ext>
+                  </a:extLst>
+                </a:gridCol>
+              </a:tblGrid>
+              <a:tr h="237629">
+                <a:tc>
+                  <a:txBody>
+                    <a:bodyPr/>
+                    <a:lstStyle/>
+                    <a:p>
+                      <a:pPr algn="l" fontAlgn="b"/>
+                      <a:r>
+                        <a:rPr lang="en-US" sz="1600" u="none" strike="noStrike">
+                          <a:effectLst/>
+                        </a:rPr>
+                        <a:t>Income Level</a:t>
+                      </a:r>
+                      <a:endParaRPr lang="en-US" sz="1600" b="0" i="0" u="none" strike="noStrike">
+                        <a:solidFill>
+                          <a:srgbClr val="000000"/>
+                        </a:solidFill>
+                        <a:effectLst/>
+                        <a:latin typeface="Calibri" panose="020F0502020204030204" pitchFamily="34" charset="0"/>
+                      </a:endParaRPr>
+                    </a:p>
+                  </a:txBody>
+                  <a:tcPr marL="5943" marR="5943" marT="5943" marB="0" anchor="b"/>
+                </a:tc>
+                <a:extLst>
+                  <a:ext uri="{0D108BD9-81ED-4DB2-BD59-A6C34878D82A}">
+                    <a16:rowId xmlns:a16="http://schemas.microsoft.com/office/drawing/2014/main" val="2513988432"/>
+                  </a:ext>
+                </a:extLst>
+              </a:tr>
+              <a:tr h="354235">
+                <a:tc>
+                  <a:txBody>
+                    <a:bodyPr/>
+                    <a:lstStyle/>
+                    <a:p>
+                      <a:pPr algn="l" fontAlgn="b"/>
+                      <a:r>
+                        <a:rPr lang="en-US" sz="1600" u="none" strike="noStrike" dirty="0">
+                          <a:effectLst/>
+                        </a:rPr>
+                        <a:t>Mean Years Schooling</a:t>
+                      </a:r>
+                      <a:endParaRPr lang="en-US" sz="1600" b="0" i="0" u="none" strike="noStrike" dirty="0">
+                        <a:solidFill>
+                          <a:srgbClr val="000000"/>
+                        </a:solidFill>
+                        <a:effectLst/>
+                        <a:latin typeface="Calibri" panose="020F0502020204030204" pitchFamily="34" charset="0"/>
+                      </a:endParaRPr>
+                    </a:p>
+                  </a:txBody>
+                  <a:tcPr marL="5943" marR="5943" marT="5943" marB="0" anchor="b"/>
+                </a:tc>
+                <a:extLst>
+                  <a:ext uri="{0D108BD9-81ED-4DB2-BD59-A6C34878D82A}">
+                    <a16:rowId xmlns:a16="http://schemas.microsoft.com/office/drawing/2014/main" val="4204587826"/>
+                  </a:ext>
+                </a:extLst>
+              </a:tr>
+              <a:tr h="237629">
+                <a:tc>
+                  <a:txBody>
+                    <a:bodyPr/>
+                    <a:lstStyle/>
+                    <a:p>
+                      <a:pPr algn="l" fontAlgn="b"/>
+                      <a:r>
+                        <a:rPr lang="en-US" sz="1600" u="none" strike="noStrike">
+                          <a:effectLst/>
+                        </a:rPr>
+                        <a:t>Education Level</a:t>
+                      </a:r>
+                      <a:endParaRPr lang="en-US" sz="1600" b="0" i="0" u="none" strike="noStrike">
+                        <a:solidFill>
+                          <a:srgbClr val="000000"/>
+                        </a:solidFill>
+                        <a:effectLst/>
+                        <a:latin typeface="Calibri" panose="020F0502020204030204" pitchFamily="34" charset="0"/>
+                      </a:endParaRPr>
+                    </a:p>
+                  </a:txBody>
+                  <a:tcPr marL="5943" marR="5943" marT="5943" marB="0" anchor="b"/>
+                </a:tc>
+                <a:extLst>
+                  <a:ext uri="{0D108BD9-81ED-4DB2-BD59-A6C34878D82A}">
+                    <a16:rowId xmlns:a16="http://schemas.microsoft.com/office/drawing/2014/main" val="2781693883"/>
+                  </a:ext>
+                </a:extLst>
+              </a:tr>
+              <a:tr h="219747">
+                <a:tc>
+                  <a:txBody>
+                    <a:bodyPr/>
+                    <a:lstStyle/>
+                    <a:p>
+                      <a:pPr algn="l" fontAlgn="b"/>
+                      <a:r>
+                        <a:rPr lang="en-US" sz="1600" u="none" strike="noStrike" dirty="0">
+                          <a:effectLst/>
+                        </a:rPr>
+                        <a:t>% White</a:t>
+                      </a:r>
+                      <a:endParaRPr lang="en-US" sz="1600" b="0" i="0" u="none" strike="noStrike" dirty="0">
+                        <a:solidFill>
+                          <a:srgbClr val="000000"/>
+                        </a:solidFill>
+                        <a:effectLst/>
+                        <a:latin typeface="Calibri" panose="020F0502020204030204" pitchFamily="34" charset="0"/>
+                      </a:endParaRPr>
+                    </a:p>
+                  </a:txBody>
+                  <a:tcPr marL="5943" marR="5943" marT="5943" marB="0" anchor="b"/>
+                </a:tc>
+                <a:extLst>
+                  <a:ext uri="{0D108BD9-81ED-4DB2-BD59-A6C34878D82A}">
+                    <a16:rowId xmlns:a16="http://schemas.microsoft.com/office/drawing/2014/main" val="2792557309"/>
+                  </a:ext>
+                </a:extLst>
+              </a:tr>
+              <a:tr h="219747">
+                <a:tc>
+                  <a:txBody>
+                    <a:bodyPr/>
+                    <a:lstStyle/>
+                    <a:p>
+                      <a:pPr algn="l" fontAlgn="b"/>
+                      <a:r>
+                        <a:rPr lang="en-US" sz="1600" u="none" strike="noStrike">
+                          <a:effectLst/>
+                        </a:rPr>
+                        <a:t>% Black</a:t>
+                      </a:r>
+                      <a:endParaRPr lang="en-US" sz="1600" b="0" i="0" u="none" strike="noStrike">
+                        <a:solidFill>
+                          <a:srgbClr val="000000"/>
+                        </a:solidFill>
+                        <a:effectLst/>
+                        <a:latin typeface="Calibri" panose="020F0502020204030204" pitchFamily="34" charset="0"/>
+                      </a:endParaRPr>
+                    </a:p>
+                  </a:txBody>
+                  <a:tcPr marL="5943" marR="5943" marT="5943" marB="0" anchor="b"/>
+                </a:tc>
+                <a:extLst>
+                  <a:ext uri="{0D108BD9-81ED-4DB2-BD59-A6C34878D82A}">
+                    <a16:rowId xmlns:a16="http://schemas.microsoft.com/office/drawing/2014/main" val="3371091514"/>
+                  </a:ext>
+                </a:extLst>
+              </a:tr>
+              <a:tr h="237629">
+                <a:tc>
+                  <a:txBody>
+                    <a:bodyPr/>
+                    <a:lstStyle/>
+                    <a:p>
+                      <a:pPr algn="l" fontAlgn="b"/>
+                      <a:r>
+                        <a:rPr lang="en-US" sz="1600" u="none" strike="noStrike">
+                          <a:effectLst/>
+                        </a:rPr>
+                        <a:t>% Native American</a:t>
+                      </a:r>
+                      <a:endParaRPr lang="en-US" sz="1600" b="0" i="0" u="none" strike="noStrike">
+                        <a:solidFill>
+                          <a:srgbClr val="000000"/>
+                        </a:solidFill>
+                        <a:effectLst/>
+                        <a:latin typeface="Calibri" panose="020F0502020204030204" pitchFamily="34" charset="0"/>
+                      </a:endParaRPr>
+                    </a:p>
+                  </a:txBody>
+                  <a:tcPr marL="5943" marR="5943" marT="5943" marB="0" anchor="b"/>
+                </a:tc>
+                <a:extLst>
+                  <a:ext uri="{0D108BD9-81ED-4DB2-BD59-A6C34878D82A}">
+                    <a16:rowId xmlns:a16="http://schemas.microsoft.com/office/drawing/2014/main" val="2284434128"/>
+                  </a:ext>
+                </a:extLst>
+              </a:tr>
+              <a:tr h="219747">
+                <a:tc>
+                  <a:txBody>
+                    <a:bodyPr/>
+                    <a:lstStyle/>
+                    <a:p>
+                      <a:pPr algn="l" fontAlgn="b"/>
+                      <a:r>
+                        <a:rPr lang="en-US" sz="1600" u="none" strike="noStrike">
+                          <a:effectLst/>
+                        </a:rPr>
+                        <a:t>% Asian</a:t>
+                      </a:r>
+                      <a:endParaRPr lang="en-US" sz="1600" b="0" i="0" u="none" strike="noStrike">
+                        <a:solidFill>
+                          <a:srgbClr val="000000"/>
+                        </a:solidFill>
+                        <a:effectLst/>
+                        <a:latin typeface="Calibri" panose="020F0502020204030204" pitchFamily="34" charset="0"/>
+                      </a:endParaRPr>
+                    </a:p>
+                  </a:txBody>
+                  <a:tcPr marL="5943" marR="5943" marT="5943" marB="0" anchor="b"/>
+                </a:tc>
+                <a:extLst>
+                  <a:ext uri="{0D108BD9-81ED-4DB2-BD59-A6C34878D82A}">
+                    <a16:rowId xmlns:a16="http://schemas.microsoft.com/office/drawing/2014/main" val="3625141221"/>
+                  </a:ext>
+                </a:extLst>
+              </a:tr>
+              <a:tr h="237629">
+                <a:tc>
+                  <a:txBody>
+                    <a:bodyPr/>
+                    <a:lstStyle/>
+                    <a:p>
+                      <a:pPr algn="l" fontAlgn="b"/>
+                      <a:r>
+                        <a:rPr lang="en-US" sz="1600" u="none" strike="noStrike" dirty="0">
+                          <a:effectLst/>
+                        </a:rPr>
+                        <a:t>% Pacific Islander</a:t>
+                      </a:r>
+                      <a:endParaRPr lang="en-US" sz="1600" b="0" i="0" u="none" strike="noStrike" dirty="0">
+                        <a:solidFill>
+                          <a:srgbClr val="000000"/>
+                        </a:solidFill>
+                        <a:effectLst/>
+                        <a:latin typeface="Calibri" panose="020F0502020204030204" pitchFamily="34" charset="0"/>
+                      </a:endParaRPr>
+                    </a:p>
+                  </a:txBody>
+                  <a:tcPr marL="5943" marR="5943" marT="5943" marB="0" anchor="b"/>
+                </a:tc>
+                <a:extLst>
+                  <a:ext uri="{0D108BD9-81ED-4DB2-BD59-A6C34878D82A}">
+                    <a16:rowId xmlns:a16="http://schemas.microsoft.com/office/drawing/2014/main" val="3681081105"/>
+                  </a:ext>
+                </a:extLst>
+              </a:tr>
+              <a:tr h="219747">
+                <a:tc>
+                  <a:txBody>
+                    <a:bodyPr/>
+                    <a:lstStyle/>
+                    <a:p>
+                      <a:pPr algn="l" fontAlgn="b"/>
+                      <a:r>
+                        <a:rPr lang="en-US" sz="1600" u="none" strike="noStrike">
+                          <a:effectLst/>
+                        </a:rPr>
+                        <a:t>% Other</a:t>
+                      </a:r>
+                      <a:endParaRPr lang="en-US" sz="1600" b="0" i="0" u="none" strike="noStrike">
+                        <a:solidFill>
+                          <a:srgbClr val="000000"/>
+                        </a:solidFill>
+                        <a:effectLst/>
+                        <a:latin typeface="Calibri" panose="020F0502020204030204" pitchFamily="34" charset="0"/>
+                      </a:endParaRPr>
+                    </a:p>
+                  </a:txBody>
+                  <a:tcPr marL="5943" marR="5943" marT="5943" marB="0" anchor="b"/>
+                </a:tc>
+                <a:extLst>
+                  <a:ext uri="{0D108BD9-81ED-4DB2-BD59-A6C34878D82A}">
+                    <a16:rowId xmlns:a16="http://schemas.microsoft.com/office/drawing/2014/main" val="3248274771"/>
+                  </a:ext>
+                </a:extLst>
+              </a:tr>
+              <a:tr h="354235">
+                <a:tc>
+                  <a:txBody>
+                    <a:bodyPr/>
+                    <a:lstStyle/>
+                    <a:p>
+                      <a:pPr algn="l" fontAlgn="b"/>
+                      <a:r>
+                        <a:rPr lang="en-US" sz="1600" u="none" strike="noStrike">
+                          <a:effectLst/>
+                        </a:rPr>
+                        <a:t>% Two or More Races</a:t>
+                      </a:r>
+                      <a:endParaRPr lang="en-US" sz="1600" b="0" i="0" u="none" strike="noStrike">
+                        <a:solidFill>
+                          <a:srgbClr val="000000"/>
+                        </a:solidFill>
+                        <a:effectLst/>
+                        <a:latin typeface="Calibri" panose="020F0502020204030204" pitchFamily="34" charset="0"/>
+                      </a:endParaRPr>
+                    </a:p>
+                  </a:txBody>
+                  <a:tcPr marL="5943" marR="5943" marT="5943" marB="0" anchor="b"/>
+                </a:tc>
+                <a:extLst>
+                  <a:ext uri="{0D108BD9-81ED-4DB2-BD59-A6C34878D82A}">
+                    <a16:rowId xmlns:a16="http://schemas.microsoft.com/office/drawing/2014/main" val="4218017157"/>
+                  </a:ext>
+                </a:extLst>
+              </a:tr>
+              <a:tr h="300057">
+                <a:tc>
+                  <a:txBody>
+                    <a:bodyPr/>
+                    <a:lstStyle/>
+                    <a:p>
+                      <a:pPr algn="l" fontAlgn="b"/>
+                      <a:r>
+                        <a:rPr lang="en-US" sz="1600" u="none" strike="noStrike">
+                          <a:effectLst/>
+                        </a:rPr>
+                        <a:t>Estimated Diabetes Rate Per 1,000</a:t>
+                      </a:r>
+                      <a:endParaRPr lang="en-US" sz="1600" b="0" i="0" u="none" strike="noStrike">
+                        <a:solidFill>
+                          <a:srgbClr val="000000"/>
+                        </a:solidFill>
+                        <a:effectLst/>
+                        <a:latin typeface="Calibri" panose="020F0502020204030204" pitchFamily="34" charset="0"/>
+                      </a:endParaRPr>
+                    </a:p>
+                  </a:txBody>
+                  <a:tcPr marL="5943" marR="5943" marT="5943" marB="0" anchor="b"/>
+                </a:tc>
+                <a:extLst>
+                  <a:ext uri="{0D108BD9-81ED-4DB2-BD59-A6C34878D82A}">
+                    <a16:rowId xmlns:a16="http://schemas.microsoft.com/office/drawing/2014/main" val="123598950"/>
+                  </a:ext>
+                </a:extLst>
+              </a:tr>
+              <a:tr h="237629">
+                <a:tc>
+                  <a:txBody>
+                    <a:bodyPr/>
+                    <a:lstStyle/>
+                    <a:p>
+                      <a:pPr algn="l" fontAlgn="b"/>
+                      <a:r>
+                        <a:rPr lang="en-US" sz="1600" u="none" strike="noStrike">
+                          <a:effectLst/>
+                        </a:rPr>
+                        <a:t>% Daily Smokers</a:t>
+                      </a:r>
+                      <a:endParaRPr lang="en-US" sz="1600" b="0" i="0" u="none" strike="noStrike">
+                        <a:solidFill>
+                          <a:srgbClr val="000000"/>
+                        </a:solidFill>
+                        <a:effectLst/>
+                        <a:latin typeface="Calibri" panose="020F0502020204030204" pitchFamily="34" charset="0"/>
+                      </a:endParaRPr>
+                    </a:p>
+                  </a:txBody>
+                  <a:tcPr marL="5943" marR="5943" marT="5943" marB="0" anchor="b"/>
+                </a:tc>
+                <a:extLst>
+                  <a:ext uri="{0D108BD9-81ED-4DB2-BD59-A6C34878D82A}">
+                    <a16:rowId xmlns:a16="http://schemas.microsoft.com/office/drawing/2014/main" val="1840535322"/>
+                  </a:ext>
+                </a:extLst>
+              </a:tr>
+              <a:tr h="354235">
+                <a:tc>
+                  <a:txBody>
+                    <a:bodyPr/>
+                    <a:lstStyle/>
+                    <a:p>
+                      <a:pPr algn="l" fontAlgn="b"/>
+                      <a:r>
+                        <a:rPr lang="en-US" sz="1600" u="none" strike="noStrike" dirty="0">
+                          <a:effectLst/>
+                        </a:rPr>
+                        <a:t>% Population Obese</a:t>
+                      </a:r>
+                      <a:endParaRPr lang="en-US" sz="1600" b="0" i="0" u="none" strike="noStrike" dirty="0">
+                        <a:solidFill>
+                          <a:srgbClr val="000000"/>
+                        </a:solidFill>
+                        <a:effectLst/>
+                        <a:latin typeface="Calibri" panose="020F0502020204030204" pitchFamily="34" charset="0"/>
+                      </a:endParaRPr>
+                    </a:p>
+                  </a:txBody>
+                  <a:tcPr marL="5943" marR="5943" marT="5943" marB="0" anchor="b"/>
+                </a:tc>
+                <a:extLst>
+                  <a:ext uri="{0D108BD9-81ED-4DB2-BD59-A6C34878D82A}">
+                    <a16:rowId xmlns:a16="http://schemas.microsoft.com/office/drawing/2014/main" val="3531771134"/>
+                  </a:ext>
+                </a:extLst>
+              </a:tr>
+            </a:tbl>
+          </a:graphicData>
+        </a:graphic>
+      </p:graphicFrame>
+      <p:sp>
+        <p:nvSpPr>
+          <p:cNvPr id="7" name="TextBox 6">
+            <a:extLst>
+              <a:ext uri="{FF2B5EF4-FFF2-40B4-BE49-F238E27FC236}">
+                <a16:creationId xmlns:a16="http://schemas.microsoft.com/office/drawing/2014/main" id="{33CC7F8B-3DEE-4A84-B1EA-6A0D7753DBF4}"/>
+              </a:ext>
+            </a:extLst>
+          </p:cNvPr>
+          <p:cNvSpPr txBox="1"/>
+          <p:nvPr/>
+        </p:nvSpPr>
+        <p:spPr>
+          <a:xfrm>
+            <a:off x="5118538" y="727906"/>
+            <a:ext cx="1954924" cy="1477328"/>
+          </a:xfrm>
+          <a:prstGeom prst="rect">
+            <a:avLst/>
+          </a:prstGeom>
+          <a:noFill/>
+        </p:spPr>
+        <p:txBody>
+          <a:bodyPr wrap="square" rtlCol="0">
+            <a:spAutoFit/>
+          </a:bodyPr>
+          <a:lstStyle/>
+          <a:p>
+            <a:r>
+              <a:rPr lang="en-US" dirty="0"/>
+              <a:t>4 Factor Blocks: Health</a:t>
+            </a:r>
+          </a:p>
+          <a:p>
+            <a:r>
+              <a:rPr lang="en-US" dirty="0"/>
+              <a:t>Income</a:t>
+            </a:r>
+          </a:p>
+          <a:p>
+            <a:r>
+              <a:rPr lang="en-US" dirty="0"/>
+              <a:t>Race</a:t>
+            </a:r>
+          </a:p>
+          <a:p>
+            <a:r>
+              <a:rPr lang="en-US" dirty="0"/>
+              <a:t>Education</a:t>
+            </a:r>
+          </a:p>
+        </p:txBody>
+      </p:sp>
+    </p:spTree>
+    <p:extLst>
+      <p:ext uri="{BB962C8B-B14F-4D97-AF65-F5344CB8AC3E}">
+        <p14:creationId xmlns:p14="http://schemas.microsoft.com/office/powerpoint/2010/main" val="2913393973"/>
+      </p:ext>
+    </p:extLst>
+  </p:cSld>
+  <p:clrMapOvr>
+    <a:masterClrMapping/>
+  </p:clrMapOvr>
+</p:sld>
+</file>
+
+<file path=ppt/slides/slide11.xml><?xml version="1.0" encoding="utf-8"?>
+<p:sld xmlns:a="http://schemas.openxmlformats.org/drawingml/2006/main" xmlns:r="http://schemas.openxmlformats.org/officeDocument/2006/relationships" xmlns:p="http://schemas.openxmlformats.org/presentationml/2006/main">
+  <p:cSld>
+    <p:spTree>
+      <p:nvGrpSpPr>
+        <p:cNvPr id="1" name=""/>
+        <p:cNvGrpSpPr/>
+        <p:nvPr/>
+      </p:nvGrpSpPr>
+      <p:grpSpPr>
+        <a:xfrm>
+          <a:off x="0" y="0"/>
+          <a:ext cx="0" cy="0"/>
+          <a:chOff x="0" y="0"/>
+          <a:chExt cx="0" cy="0"/>
+        </a:xfrm>
+      </p:grpSpPr>
+      <p:sp>
+        <p:nvSpPr>
+          <p:cNvPr id="27" name="Rectangle 9">
+            <a:extLst>
+              <a:ext uri="{FF2B5EF4-FFF2-40B4-BE49-F238E27FC236}">
+                <a16:creationId xmlns:a16="http://schemas.microsoft.com/office/drawing/2014/main" id="{8D70B121-56F4-4848-B38B-182089D909FA}"/>
+              </a:ext>
+              <a:ext uri="{C183D7F6-B498-43B3-948B-1728B52AA6E4}">
+                <adec:decorative xmlns:adec="http://schemas.microsoft.com/office/drawing/2017/decorative" val="1"/>
+              </a:ext>
+            </a:extLst>
+          </p:cNvPr>
+          <p:cNvSpPr>
+            <a:spLocks noGrp="1" noRot="1" noChangeAspect="1" noMove="1" noResize="1" noEditPoints="1" noAdjustHandles="1" noChangeArrowheads="1" noChangeShapeType="1" noTextEdit="1"/>
+          </p:cNvSpPr>
+          <p:nvPr>
+            <p:extLst>
+              <p:ext uri="{386F3935-93C4-4BCD-93E2-E3B085C9AB24}">
+                <p16:designElem xmlns:p16="http://schemas.microsoft.com/office/powerpoint/2015/main" val="1"/>
+              </p:ext>
+            </p:extLst>
+          </p:nvPr>
+        </p:nvSpPr>
+        <p:spPr bwMode="ltGray">
+          <a:xfrm>
+            <a:off x="321564" y="320040"/>
+            <a:ext cx="11548872" cy="6217920"/>
+          </a:xfrm>
+          <a:prstGeom prst="rect">
+            <a:avLst/>
+          </a:prstGeom>
+          <a:solidFill>
+            <a:schemeClr val="tx1">
+              <a:alpha val="8000"/>
+            </a:schemeClr>
+          </a:solidFill>
+          <a:ln w="127000" cap="sq" cmpd="thinThick">
+            <a:noFill/>
+          </a:ln>
+        </p:spPr>
+        <p:style>
+          <a:lnRef idx="2">
+            <a:schemeClr val="accent1">
+              <a:shade val="50000"/>
+            </a:schemeClr>
+          </a:lnRef>
+          <a:fillRef idx="1">
+            <a:schemeClr val="accent1"/>
+          </a:fillRef>
+          <a:effectRef idx="0">
+            <a:schemeClr val="accent1"/>
+          </a:effectRef>
+          <a:fontRef idx="minor">
+            <a:schemeClr val="lt1"/>
+          </a:fontRef>
+        </p:style>
+        <p:txBody>
+          <a:bodyPr rtlCol="0" anchor="ctr"/>
+          <a:lstStyle/>
+          <a:p>
+            <a:pPr algn="ctr"/>
+            <a:endParaRPr lang="en-US"/>
+          </a:p>
+        </p:txBody>
+      </p:sp>
+      <p:sp>
+        <p:nvSpPr>
+          <p:cNvPr id="4" name="Title 3">
+            <a:extLst>
+              <a:ext uri="{FF2B5EF4-FFF2-40B4-BE49-F238E27FC236}">
+                <a16:creationId xmlns:a16="http://schemas.microsoft.com/office/drawing/2014/main" id="{9860BD11-FBA7-4C2B-B8D3-9608DBCCD7F3}"/>
+              </a:ext>
+            </a:extLst>
+          </p:cNvPr>
+          <p:cNvSpPr>
+            <a:spLocks noGrp="1"/>
+          </p:cNvSpPr>
+          <p:nvPr>
+            <p:ph type="title"/>
+          </p:nvPr>
+        </p:nvSpPr>
+        <p:spPr>
+          <a:xfrm>
+            <a:off x="838200" y="963877"/>
+            <a:ext cx="3494362" cy="4930246"/>
+          </a:xfrm>
+        </p:spPr>
+        <p:txBody>
+          <a:bodyPr>
+            <a:normAutofit/>
+          </a:bodyPr>
+          <a:lstStyle/>
+          <a:p>
+            <a:pPr algn="r"/>
+            <a:r>
+              <a:rPr lang="en-US" dirty="0">
+                <a:solidFill>
+                  <a:schemeClr val="accent1"/>
+                </a:solidFill>
+              </a:rPr>
+              <a:t>Data Exploration: Correlations</a:t>
+            </a:r>
+          </a:p>
+        </p:txBody>
+      </p:sp>
+      <p:cxnSp>
+        <p:nvCxnSpPr>
+          <p:cNvPr id="28" name="Straight Connector 11">
+            <a:extLst>
+              <a:ext uri="{FF2B5EF4-FFF2-40B4-BE49-F238E27FC236}">
+                <a16:creationId xmlns:a16="http://schemas.microsoft.com/office/drawing/2014/main" id="{2D72A2C9-F3CA-4216-8BAD-FA4C970C3C4E}"/>
+              </a:ext>
+              <a:ext uri="{C183D7F6-B498-43B3-948B-1728B52AA6E4}">
+                <adec:decorative xmlns:adec="http://schemas.microsoft.com/office/drawing/2017/decorative" val="1"/>
+              </a:ext>
+            </a:extLst>
+          </p:cNvPr>
+          <p:cNvCxnSpPr>
+            <a:cxnSpLocks noGrp="1" noRot="1" noChangeAspect="1" noMove="1" noResize="1" noEditPoints="1" noAdjustHandles="1" noChangeArrowheads="1" noChangeShapeType="1"/>
+          </p:cNvCxnSpPr>
+          <p:nvPr>
+            <p:extLst>
+              <p:ext uri="{386F3935-93C4-4BCD-93E2-E3B085C9AB24}">
+                <p16:designElem xmlns:p16="http://schemas.microsoft.com/office/powerpoint/2015/main" val="1"/>
+              </p:ext>
+            </p:extLst>
+          </p:nvPr>
+        </p:nvCxnSpPr>
+        <p:spPr>
+          <a:xfrm>
+            <a:off x="4654296" y="2057400"/>
+            <a:ext cx="0" cy="2743200"/>
+          </a:xfrm>
+          <a:prstGeom prst="line">
+            <a:avLst/>
+          </a:prstGeom>
+          <a:ln w="19050">
+            <a:solidFill>
+              <a:schemeClr val="tx1">
+                <a:lumMod val="85000"/>
+                <a:lumOff val="15000"/>
+              </a:schemeClr>
+            </a:solidFill>
+          </a:ln>
+        </p:spPr>
+        <p:style>
+          <a:lnRef idx="1">
+            <a:schemeClr val="accent1"/>
+          </a:lnRef>
+          <a:fillRef idx="0">
+            <a:schemeClr val="accent1"/>
+          </a:fillRef>
+          <a:effectRef idx="0">
+            <a:schemeClr val="accent1"/>
+          </a:effectRef>
+          <a:fontRef idx="minor">
+            <a:schemeClr val="tx1"/>
+          </a:fontRef>
+        </p:style>
+      </p:cxnSp>
+      <p:pic>
+        <p:nvPicPr>
+          <p:cNvPr id="2" name="Picture 1">
+            <a:extLst>
+              <a:ext uri="{FF2B5EF4-FFF2-40B4-BE49-F238E27FC236}">
+                <a16:creationId xmlns:a16="http://schemas.microsoft.com/office/drawing/2014/main" id="{70159743-625F-4460-9073-2217E768997F}"/>
+              </a:ext>
+            </a:extLst>
+          </p:cNvPr>
+          <p:cNvPicPr>
+            <a:picLocks noChangeAspect="1"/>
+          </p:cNvPicPr>
+          <p:nvPr/>
+        </p:nvPicPr>
+        <p:blipFill>
+          <a:blip r:embed="rId2"/>
+          <a:stretch>
+            <a:fillRect/>
+          </a:stretch>
+        </p:blipFill>
+        <p:spPr>
+          <a:xfrm>
+            <a:off x="4849198" y="1284061"/>
+            <a:ext cx="6764843" cy="1864151"/>
+          </a:xfrm>
+          <a:prstGeom prst="rect">
+            <a:avLst/>
+          </a:prstGeom>
+        </p:spPr>
+      </p:pic>
+      <p:pic>
+        <p:nvPicPr>
+          <p:cNvPr id="3" name="Picture 2">
+            <a:extLst>
+              <a:ext uri="{FF2B5EF4-FFF2-40B4-BE49-F238E27FC236}">
+                <a16:creationId xmlns:a16="http://schemas.microsoft.com/office/drawing/2014/main" id="{C787B3E1-BFC9-42B8-97F4-B2309FC8FECB}"/>
+              </a:ext>
+            </a:extLst>
+          </p:cNvPr>
+          <p:cNvPicPr>
+            <a:picLocks noChangeAspect="1"/>
+          </p:cNvPicPr>
+          <p:nvPr/>
+        </p:nvPicPr>
+        <p:blipFill>
+          <a:blip r:embed="rId3"/>
+          <a:stretch>
+            <a:fillRect/>
+          </a:stretch>
+        </p:blipFill>
+        <p:spPr>
+          <a:xfrm>
+            <a:off x="4976031" y="4043702"/>
+            <a:ext cx="4855200" cy="1679141"/>
+          </a:xfrm>
+          <a:prstGeom prst="rect">
+            <a:avLst/>
+          </a:prstGeom>
+        </p:spPr>
+      </p:pic>
+      <p:sp>
+        <p:nvSpPr>
+          <p:cNvPr id="8" name="TextBox 7">
+            <a:extLst>
+              <a:ext uri="{FF2B5EF4-FFF2-40B4-BE49-F238E27FC236}">
+                <a16:creationId xmlns:a16="http://schemas.microsoft.com/office/drawing/2014/main" id="{1922A998-3B66-46A9-82FB-CD9AE5C9FB35}"/>
+              </a:ext>
+            </a:extLst>
+          </p:cNvPr>
+          <p:cNvSpPr txBox="1"/>
+          <p:nvPr/>
+        </p:nvSpPr>
+        <p:spPr>
+          <a:xfrm>
+            <a:off x="9953805" y="4144608"/>
+            <a:ext cx="1794057" cy="1477328"/>
+          </a:xfrm>
+          <a:prstGeom prst="rect">
+            <a:avLst/>
+          </a:prstGeom>
+          <a:noFill/>
+        </p:spPr>
+        <p:txBody>
+          <a:bodyPr wrap="square" rtlCol="0">
+            <a:spAutoFit/>
+          </a:bodyPr>
+          <a:lstStyle/>
+          <a:p>
+            <a:r>
+              <a:rPr lang="en-US" dirty="0"/>
+              <a:t>Multicollinearity within some factor blocks – consider limiting factors used?</a:t>
+            </a:r>
+          </a:p>
+        </p:txBody>
+      </p:sp>
+    </p:spTree>
+    <p:extLst>
+      <p:ext uri="{BB962C8B-B14F-4D97-AF65-F5344CB8AC3E}">
+        <p14:creationId xmlns:p14="http://schemas.microsoft.com/office/powerpoint/2010/main" val="443687419"/>
+      </p:ext>
+    </p:extLst>
+  </p:cSld>
+  <p:clrMapOvr>
+    <a:masterClrMapping/>
+  </p:clrMapOvr>
+</p:sld>
+</file>
+
+<file path=ppt/slides/slide12.xml><?xml version="1.0" encoding="utf-8"?>
+<p:sld xmlns:a="http://schemas.openxmlformats.org/drawingml/2006/main" xmlns:r="http://schemas.openxmlformats.org/officeDocument/2006/relationships" xmlns:p="http://schemas.openxmlformats.org/presentationml/2006/main">
+  <p:cSld>
+    <p:spTree>
+      <p:nvGrpSpPr>
+        <p:cNvPr id="1" name=""/>
+        <p:cNvGrpSpPr/>
+        <p:nvPr/>
+      </p:nvGrpSpPr>
+      <p:grpSpPr>
+        <a:xfrm>
+          <a:off x="0" y="0"/>
+          <a:ext cx="0" cy="0"/>
+          <a:chOff x="0" y="0"/>
+          <a:chExt cx="0" cy="0"/>
+        </a:xfrm>
+      </p:grpSpPr>
+      <p:sp>
+        <p:nvSpPr>
+          <p:cNvPr id="27" name="Rectangle 9">
+            <a:extLst>
+              <a:ext uri="{FF2B5EF4-FFF2-40B4-BE49-F238E27FC236}">
+                <a16:creationId xmlns:a16="http://schemas.microsoft.com/office/drawing/2014/main" id="{8D70B121-56F4-4848-B38B-182089D909FA}"/>
+              </a:ext>
+              <a:ext uri="{C183D7F6-B498-43B3-948B-1728B52AA6E4}">
+                <adec:decorative xmlns:adec="http://schemas.microsoft.com/office/drawing/2017/decorative" val="1"/>
+              </a:ext>
+            </a:extLst>
+          </p:cNvPr>
+          <p:cNvSpPr>
+            <a:spLocks noGrp="1" noRot="1" noChangeAspect="1" noMove="1" noResize="1" noEditPoints="1" noAdjustHandles="1" noChangeArrowheads="1" noChangeShapeType="1" noTextEdit="1"/>
+          </p:cNvSpPr>
+          <p:nvPr>
+            <p:extLst>
+              <p:ext uri="{386F3935-93C4-4BCD-93E2-E3B085C9AB24}">
+                <p16:designElem xmlns:p16="http://schemas.microsoft.com/office/powerpoint/2015/main" val="1"/>
+              </p:ext>
+            </p:extLst>
+          </p:nvPr>
+        </p:nvSpPr>
+        <p:spPr bwMode="ltGray">
+          <a:xfrm>
+            <a:off x="321564" y="320040"/>
+            <a:ext cx="11548872" cy="6217920"/>
+          </a:xfrm>
+          <a:prstGeom prst="rect">
+            <a:avLst/>
+          </a:prstGeom>
+          <a:solidFill>
+            <a:schemeClr val="tx1">
+              <a:alpha val="8000"/>
+            </a:schemeClr>
+          </a:solidFill>
+          <a:ln w="127000" cap="sq" cmpd="thinThick">
+            <a:noFill/>
+          </a:ln>
+        </p:spPr>
+        <p:style>
+          <a:lnRef idx="2">
+            <a:schemeClr val="accent1">
+              <a:shade val="50000"/>
+            </a:schemeClr>
+          </a:lnRef>
+          <a:fillRef idx="1">
+            <a:schemeClr val="accent1"/>
+          </a:fillRef>
+          <a:effectRef idx="0">
+            <a:schemeClr val="accent1"/>
+          </a:effectRef>
+          <a:fontRef idx="minor">
+            <a:schemeClr val="lt1"/>
+          </a:fontRef>
+        </p:style>
+        <p:txBody>
+          <a:bodyPr rtlCol="0" anchor="ctr"/>
+          <a:lstStyle/>
+          <a:p>
+            <a:pPr algn="ctr"/>
+            <a:endParaRPr lang="en-US"/>
+          </a:p>
+        </p:txBody>
+      </p:sp>
+      <p:sp>
+        <p:nvSpPr>
+          <p:cNvPr id="4" name="Title 3">
+            <a:extLst>
+              <a:ext uri="{FF2B5EF4-FFF2-40B4-BE49-F238E27FC236}">
+                <a16:creationId xmlns:a16="http://schemas.microsoft.com/office/drawing/2014/main" id="{9860BD11-FBA7-4C2B-B8D3-9608DBCCD7F3}"/>
+              </a:ext>
+            </a:extLst>
+          </p:cNvPr>
+          <p:cNvSpPr>
+            <a:spLocks noGrp="1"/>
+          </p:cNvSpPr>
+          <p:nvPr>
+            <p:ph type="title"/>
+          </p:nvPr>
+        </p:nvSpPr>
+        <p:spPr>
+          <a:xfrm>
+            <a:off x="838200" y="963877"/>
+            <a:ext cx="3494362" cy="4930246"/>
+          </a:xfrm>
+        </p:spPr>
+        <p:txBody>
+          <a:bodyPr>
+            <a:normAutofit/>
+          </a:bodyPr>
+          <a:lstStyle/>
+          <a:p>
+            <a:pPr algn="r"/>
+            <a:r>
+              <a:rPr lang="en-US" dirty="0">
+                <a:solidFill>
+                  <a:schemeClr val="accent1"/>
+                </a:solidFill>
+              </a:rPr>
+              <a:t>Data Exploration: Multiple Linear Regression (no training)</a:t>
+            </a:r>
+          </a:p>
+        </p:txBody>
+      </p:sp>
+      <p:cxnSp>
+        <p:nvCxnSpPr>
+          <p:cNvPr id="28" name="Straight Connector 11">
+            <a:extLst>
+              <a:ext uri="{FF2B5EF4-FFF2-40B4-BE49-F238E27FC236}">
+                <a16:creationId xmlns:a16="http://schemas.microsoft.com/office/drawing/2014/main" id="{2D72A2C9-F3CA-4216-8BAD-FA4C970C3C4E}"/>
+              </a:ext>
+              <a:ext uri="{C183D7F6-B498-43B3-948B-1728B52AA6E4}">
+                <adec:decorative xmlns:adec="http://schemas.microsoft.com/office/drawing/2017/decorative" val="1"/>
+              </a:ext>
+            </a:extLst>
+          </p:cNvPr>
+          <p:cNvCxnSpPr>
+            <a:cxnSpLocks noGrp="1" noRot="1" noChangeAspect="1" noMove="1" noResize="1" noEditPoints="1" noAdjustHandles="1" noChangeArrowheads="1" noChangeShapeType="1"/>
+          </p:cNvCxnSpPr>
+          <p:nvPr>
+            <p:extLst>
+              <p:ext uri="{386F3935-93C4-4BCD-93E2-E3B085C9AB24}">
+                <p16:designElem xmlns:p16="http://schemas.microsoft.com/office/powerpoint/2015/main" val="1"/>
+              </p:ext>
+            </p:extLst>
+          </p:nvPr>
+        </p:nvCxnSpPr>
+        <p:spPr>
+          <a:xfrm>
+            <a:off x="4654296" y="2057400"/>
+            <a:ext cx="0" cy="2743200"/>
+          </a:xfrm>
+          <a:prstGeom prst="line">
+            <a:avLst/>
+          </a:prstGeom>
+          <a:ln w="19050">
+            <a:solidFill>
+              <a:schemeClr val="tx1">
+                <a:lumMod val="85000"/>
+                <a:lumOff val="15000"/>
+              </a:schemeClr>
+            </a:solidFill>
+          </a:ln>
+        </p:spPr>
+        <p:style>
+          <a:lnRef idx="1">
+            <a:schemeClr val="accent1"/>
+          </a:lnRef>
+          <a:fillRef idx="0">
+            <a:schemeClr val="accent1"/>
+          </a:fillRef>
+          <a:effectRef idx="0">
+            <a:schemeClr val="accent1"/>
+          </a:effectRef>
+          <a:fontRef idx="minor">
+            <a:schemeClr val="tx1"/>
+          </a:fontRef>
+        </p:style>
+      </p:cxnSp>
+      <p:pic>
+        <p:nvPicPr>
+          <p:cNvPr id="5" name="Picture 4">
+            <a:extLst>
+              <a:ext uri="{FF2B5EF4-FFF2-40B4-BE49-F238E27FC236}">
+                <a16:creationId xmlns:a16="http://schemas.microsoft.com/office/drawing/2014/main" id="{342169B4-C964-4730-B424-568B5F3E30A4}"/>
+              </a:ext>
+            </a:extLst>
+          </p:cNvPr>
+          <p:cNvPicPr>
+            <a:picLocks noChangeAspect="1"/>
+          </p:cNvPicPr>
+          <p:nvPr/>
+        </p:nvPicPr>
+        <p:blipFill>
+          <a:blip r:embed="rId3"/>
+          <a:stretch>
+            <a:fillRect/>
+          </a:stretch>
+        </p:blipFill>
+        <p:spPr>
+          <a:xfrm>
+            <a:off x="4976031" y="1102049"/>
+            <a:ext cx="6757618" cy="4653902"/>
+          </a:xfrm>
+          <a:prstGeom prst="rect">
+            <a:avLst/>
+          </a:prstGeom>
+        </p:spPr>
+      </p:pic>
+      <p:sp>
+        <p:nvSpPr>
+          <p:cNvPr id="6" name="Rectangle: Rounded Corners 5">
+            <a:extLst>
+              <a:ext uri="{FF2B5EF4-FFF2-40B4-BE49-F238E27FC236}">
+                <a16:creationId xmlns:a16="http://schemas.microsoft.com/office/drawing/2014/main" id="{EF55DEEA-6BF8-463A-A1D9-4B4A2DE3C06A}"/>
+              </a:ext>
+            </a:extLst>
+          </p:cNvPr>
+          <p:cNvSpPr/>
+          <p:nvPr/>
+        </p:nvSpPr>
+        <p:spPr>
+          <a:xfrm>
+            <a:off x="6873765" y="1502980"/>
+            <a:ext cx="515007" cy="533400"/>
+          </a:xfrm>
+          <a:prstGeom prst="roundRect">
+            <a:avLst/>
+          </a:prstGeom>
+          <a:noFill/>
+          <a:ln w="38100"/>
+        </p:spPr>
+        <p:style>
+          <a:lnRef idx="2">
+            <a:schemeClr val="accent1">
+              <a:shade val="50000"/>
+            </a:schemeClr>
+          </a:lnRef>
+          <a:fillRef idx="1">
+            <a:schemeClr val="accent1"/>
+          </a:fillRef>
+          <a:effectRef idx="0">
+            <a:schemeClr val="accent1"/>
+          </a:effectRef>
+          <a:fontRef idx="minor">
+            <a:schemeClr val="lt1"/>
+          </a:fontRef>
+        </p:style>
+        <p:txBody>
+          <a:bodyPr rtlCol="0" anchor="ctr"/>
+          <a:lstStyle/>
+          <a:p>
+            <a:pPr algn="ctr"/>
+            <a:endParaRPr lang="en-US" dirty="0"/>
+          </a:p>
+        </p:txBody>
+      </p:sp>
+      <p:sp>
+        <p:nvSpPr>
+          <p:cNvPr id="7" name="TextBox 6">
+            <a:extLst>
+              <a:ext uri="{FF2B5EF4-FFF2-40B4-BE49-F238E27FC236}">
+                <a16:creationId xmlns:a16="http://schemas.microsoft.com/office/drawing/2014/main" id="{D8CB4BD8-5C86-4B94-9297-BF2B7B329FDA}"/>
+              </a:ext>
+            </a:extLst>
+          </p:cNvPr>
+          <p:cNvSpPr txBox="1"/>
+          <p:nvPr/>
+        </p:nvSpPr>
+        <p:spPr>
+          <a:xfrm>
+            <a:off x="7882759" y="1397876"/>
+            <a:ext cx="2175641" cy="646331"/>
+          </a:xfrm>
+          <a:prstGeom prst="rect">
+            <a:avLst/>
+          </a:prstGeom>
+          <a:noFill/>
+        </p:spPr>
+        <p:txBody>
+          <a:bodyPr wrap="square" rtlCol="0">
+            <a:spAutoFit/>
+          </a:bodyPr>
+          <a:lstStyle/>
+          <a:p>
+            <a:r>
+              <a:rPr lang="en-US" dirty="0"/>
+              <a:t>No training, overfitting</a:t>
+            </a:r>
+          </a:p>
+        </p:txBody>
+      </p:sp>
+    </p:spTree>
+    <p:extLst>
+      <p:ext uri="{BB962C8B-B14F-4D97-AF65-F5344CB8AC3E}">
+        <p14:creationId xmlns:p14="http://schemas.microsoft.com/office/powerpoint/2010/main" val="1836953958"/>
+      </p:ext>
+    </p:extLst>
+  </p:cSld>
+  <p:clrMapOvr>
+    <a:masterClrMapping/>
+  </p:clrMapOvr>
+</p:sld>
+</file>
+
+<file path=ppt/slides/slide13.xml><?xml version="1.0" encoding="utf-8"?>
+<p:sld xmlns:a="http://schemas.openxmlformats.org/drawingml/2006/main" xmlns:r="http://schemas.openxmlformats.org/officeDocument/2006/relationships" xmlns:p="http://schemas.openxmlformats.org/presentationml/2006/main">
+  <p:cSld>
+    <p:spTree>
+      <p:nvGrpSpPr>
+        <p:cNvPr id="1" name=""/>
+        <p:cNvGrpSpPr/>
+        <p:nvPr/>
+      </p:nvGrpSpPr>
+      <p:grpSpPr>
+        <a:xfrm>
+          <a:off x="0" y="0"/>
+          <a:ext cx="0" cy="0"/>
+          <a:chOff x="0" y="0"/>
+          <a:chExt cx="0" cy="0"/>
+        </a:xfrm>
+      </p:grpSpPr>
+      <p:sp>
+        <p:nvSpPr>
+          <p:cNvPr id="27" name="Rectangle 9">
+            <a:extLst>
+              <a:ext uri="{FF2B5EF4-FFF2-40B4-BE49-F238E27FC236}">
+                <a16:creationId xmlns:a16="http://schemas.microsoft.com/office/drawing/2014/main" id="{8D70B121-56F4-4848-B38B-182089D909FA}"/>
+              </a:ext>
+              <a:ext uri="{C183D7F6-B498-43B3-948B-1728B52AA6E4}">
+                <adec:decorative xmlns:adec="http://schemas.microsoft.com/office/drawing/2017/decorative" val="1"/>
+              </a:ext>
+            </a:extLst>
+          </p:cNvPr>
+          <p:cNvSpPr>
+            <a:spLocks noGrp="1" noRot="1" noChangeAspect="1" noMove="1" noResize="1" noEditPoints="1" noAdjustHandles="1" noChangeArrowheads="1" noChangeShapeType="1" noTextEdit="1"/>
+          </p:cNvSpPr>
+          <p:nvPr>
+            <p:extLst>
+              <p:ext uri="{386F3935-93C4-4BCD-93E2-E3B085C9AB24}">
+                <p16:designElem xmlns:p16="http://schemas.microsoft.com/office/powerpoint/2015/main" val="1"/>
+              </p:ext>
+            </p:extLst>
+          </p:nvPr>
+        </p:nvSpPr>
+        <p:spPr bwMode="ltGray">
+          <a:xfrm>
+            <a:off x="321564" y="320040"/>
+            <a:ext cx="11548872" cy="6217920"/>
+          </a:xfrm>
+          <a:prstGeom prst="rect">
+            <a:avLst/>
+          </a:prstGeom>
+          <a:solidFill>
+            <a:schemeClr val="tx1">
+              <a:alpha val="8000"/>
+            </a:schemeClr>
+          </a:solidFill>
+          <a:ln w="127000" cap="sq" cmpd="thinThick">
+            <a:noFill/>
+          </a:ln>
+        </p:spPr>
+        <p:style>
+          <a:lnRef idx="2">
+            <a:schemeClr val="accent1">
+              <a:shade val="50000"/>
+            </a:schemeClr>
+          </a:lnRef>
+          <a:fillRef idx="1">
+            <a:schemeClr val="accent1"/>
+          </a:fillRef>
+          <a:effectRef idx="0">
+            <a:schemeClr val="accent1"/>
+          </a:effectRef>
+          <a:fontRef idx="minor">
+            <a:schemeClr val="lt1"/>
+          </a:fontRef>
+        </p:style>
+        <p:txBody>
+          <a:bodyPr rtlCol="0" anchor="ctr"/>
+          <a:lstStyle/>
+          <a:p>
+            <a:pPr algn="ctr"/>
+            <a:endParaRPr lang="en-US"/>
+          </a:p>
+        </p:txBody>
+      </p:sp>
+      <p:sp>
+        <p:nvSpPr>
+          <p:cNvPr id="4" name="Title 3">
+            <a:extLst>
+              <a:ext uri="{FF2B5EF4-FFF2-40B4-BE49-F238E27FC236}">
+                <a16:creationId xmlns:a16="http://schemas.microsoft.com/office/drawing/2014/main" id="{9860BD11-FBA7-4C2B-B8D3-9608DBCCD7F3}"/>
+              </a:ext>
+            </a:extLst>
+          </p:cNvPr>
+          <p:cNvSpPr>
+            <a:spLocks noGrp="1"/>
+          </p:cNvSpPr>
+          <p:nvPr>
+            <p:ph type="title"/>
+          </p:nvPr>
+        </p:nvSpPr>
+        <p:spPr>
+          <a:xfrm>
+            <a:off x="838200" y="963877"/>
+            <a:ext cx="3494362" cy="4930246"/>
+          </a:xfrm>
+        </p:spPr>
+        <p:txBody>
+          <a:bodyPr>
+            <a:normAutofit/>
+          </a:bodyPr>
+          <a:lstStyle/>
+          <a:p>
+            <a:pPr algn="r"/>
+            <a:r>
+              <a:rPr lang="en-US" dirty="0">
+                <a:solidFill>
+                  <a:schemeClr val="accent1"/>
+                </a:solidFill>
+              </a:rPr>
+              <a:t>Machine Learning – Multiple Linear Regression with Training</a:t>
+            </a:r>
+          </a:p>
+        </p:txBody>
+      </p:sp>
+      <p:cxnSp>
+        <p:nvCxnSpPr>
+          <p:cNvPr id="28" name="Straight Connector 11">
+            <a:extLst>
+              <a:ext uri="{FF2B5EF4-FFF2-40B4-BE49-F238E27FC236}">
+                <a16:creationId xmlns:a16="http://schemas.microsoft.com/office/drawing/2014/main" id="{2D72A2C9-F3CA-4216-8BAD-FA4C970C3C4E}"/>
+              </a:ext>
+              <a:ext uri="{C183D7F6-B498-43B3-948B-1728B52AA6E4}">
+                <adec:decorative xmlns:adec="http://schemas.microsoft.com/office/drawing/2017/decorative" val="1"/>
+              </a:ext>
+            </a:extLst>
+          </p:cNvPr>
+          <p:cNvCxnSpPr>
+            <a:cxnSpLocks noGrp="1" noRot="1" noChangeAspect="1" noMove="1" noResize="1" noEditPoints="1" noAdjustHandles="1" noChangeArrowheads="1" noChangeShapeType="1"/>
+          </p:cNvCxnSpPr>
+          <p:nvPr>
+            <p:extLst>
+              <p:ext uri="{386F3935-93C4-4BCD-93E2-E3B085C9AB24}">
+                <p16:designElem xmlns:p16="http://schemas.microsoft.com/office/powerpoint/2015/main" val="1"/>
+              </p:ext>
+            </p:extLst>
+          </p:nvPr>
+        </p:nvCxnSpPr>
+        <p:spPr>
+          <a:xfrm>
+            <a:off x="4654296" y="2057400"/>
+            <a:ext cx="0" cy="2743200"/>
+          </a:xfrm>
+          <a:prstGeom prst="line">
+            <a:avLst/>
+          </a:prstGeom>
+          <a:ln w="19050">
+            <a:solidFill>
+              <a:schemeClr val="tx1">
+                <a:lumMod val="85000"/>
+                <a:lumOff val="15000"/>
+              </a:schemeClr>
+            </a:solidFill>
+          </a:ln>
+        </p:spPr>
+        <p:style>
+          <a:lnRef idx="1">
+            <a:schemeClr val="accent1"/>
+          </a:lnRef>
+          <a:fillRef idx="0">
+            <a:schemeClr val="accent1"/>
+          </a:fillRef>
+          <a:effectRef idx="0">
+            <a:schemeClr val="accent1"/>
+          </a:effectRef>
+          <a:fontRef idx="minor">
+            <a:schemeClr val="tx1"/>
+          </a:fontRef>
+        </p:style>
+      </p:cxnSp>
+      <p:graphicFrame>
+        <p:nvGraphicFramePr>
+          <p:cNvPr id="11" name="Table 10">
+            <a:extLst>
+              <a:ext uri="{FF2B5EF4-FFF2-40B4-BE49-F238E27FC236}">
+                <a16:creationId xmlns:a16="http://schemas.microsoft.com/office/drawing/2014/main" id="{5411A1EF-505E-4037-BD85-E910C645C317}"/>
+              </a:ext>
+            </a:extLst>
+          </p:cNvPr>
+          <p:cNvGraphicFramePr>
+            <a:graphicFrameLocks noGrp="1"/>
+          </p:cNvGraphicFramePr>
+          <p:nvPr>
+            <p:extLst/>
+          </p:nvPr>
+        </p:nvGraphicFramePr>
+        <p:xfrm>
+          <a:off x="5107140" y="1527144"/>
+          <a:ext cx="6310452" cy="4374815"/>
+        </p:xfrm>
+        <a:graphic>
+          <a:graphicData uri="http://schemas.openxmlformats.org/drawingml/2006/table">
+            <a:tbl>
+              <a:tblPr firstRow="1" bandRow="1">
+                <a:tableStyleId>{5C22544A-7EE6-4342-B048-85BDC9FD1C3A}</a:tableStyleId>
+              </a:tblPr>
+              <a:tblGrid>
+                <a:gridCol w="3912245">
+                  <a:extLst>
+                    <a:ext uri="{9D8B030D-6E8A-4147-A177-3AD203B41FA5}">
+                      <a16:colId xmlns:a16="http://schemas.microsoft.com/office/drawing/2014/main" val="3600281848"/>
+                    </a:ext>
+                  </a:extLst>
+                </a:gridCol>
+                <a:gridCol w="966369">
+                  <a:extLst>
+                    <a:ext uri="{9D8B030D-6E8A-4147-A177-3AD203B41FA5}">
+                      <a16:colId xmlns:a16="http://schemas.microsoft.com/office/drawing/2014/main" val="3458087568"/>
+                    </a:ext>
+                  </a:extLst>
+                </a:gridCol>
+                <a:gridCol w="1431838">
+                  <a:extLst>
+                    <a:ext uri="{9D8B030D-6E8A-4147-A177-3AD203B41FA5}">
+                      <a16:colId xmlns:a16="http://schemas.microsoft.com/office/drawing/2014/main" val="2139526434"/>
+                    </a:ext>
+                  </a:extLst>
+                </a:gridCol>
+              </a:tblGrid>
+              <a:tr h="622167">
+                <a:tc>
+                  <a:txBody>
+                    <a:bodyPr/>
+                    <a:lstStyle/>
+                    <a:p>
+                      <a:pPr algn="ctr"/>
+                      <a:r>
+                        <a:rPr lang="en-US" dirty="0"/>
+                        <a:t>Factors used</a:t>
+                      </a:r>
+                    </a:p>
+                  </a:txBody>
+                  <a:tcPr/>
+                </a:tc>
+                <a:tc>
+                  <a:txBody>
+                    <a:bodyPr/>
+                    <a:lstStyle/>
+                    <a:p>
+                      <a:pPr algn="ctr"/>
+                      <a:r>
+                        <a:rPr lang="en-US" dirty="0"/>
+                        <a:t>R</a:t>
+                      </a:r>
+                      <a:r>
+                        <a:rPr lang="en-US" baseline="30000" dirty="0"/>
+                        <a:t>2</a:t>
+                      </a:r>
+                      <a:endParaRPr lang="en-US" dirty="0"/>
+                    </a:p>
+                  </a:txBody>
+                  <a:tcPr/>
+                </a:tc>
+                <a:tc>
+                  <a:txBody>
+                    <a:bodyPr/>
+                    <a:lstStyle/>
+                    <a:p>
+                      <a:r>
+                        <a:rPr lang="en-US" dirty="0"/>
+                        <a:t>MSE</a:t>
+                      </a:r>
+                    </a:p>
+                    <a:p>
+                      <a:endParaRPr lang="en-US" dirty="0"/>
+                    </a:p>
+                  </a:txBody>
+                  <a:tcPr/>
+                </a:tc>
+                <a:extLst>
+                  <a:ext uri="{0D108BD9-81ED-4DB2-BD59-A6C34878D82A}">
+                    <a16:rowId xmlns:a16="http://schemas.microsoft.com/office/drawing/2014/main" val="3025463091"/>
+                  </a:ext>
+                </a:extLst>
+              </a:tr>
+              <a:tr h="490915">
+                <a:tc>
+                  <a:txBody>
+                    <a:bodyPr/>
+                    <a:lstStyle/>
+                    <a:p>
+                      <a:pPr algn="ctr"/>
+                      <a:r>
+                        <a:rPr lang="en-US" dirty="0"/>
+                        <a:t>All Factors</a:t>
+                      </a:r>
+                    </a:p>
+                    <a:p>
+                      <a:pPr algn="ctr"/>
+                      <a:r>
+                        <a:rPr lang="en-US" dirty="0"/>
+                        <a:t>(13 factors)</a:t>
+                      </a:r>
+                    </a:p>
+                  </a:txBody>
+                  <a:tcPr/>
+                </a:tc>
+                <a:tc>
+                  <a:txBody>
+                    <a:bodyPr/>
+                    <a:lstStyle/>
+                    <a:p>
+                      <a:pPr algn="ctr"/>
+                      <a:r>
+                        <a:rPr lang="en-US" dirty="0"/>
+                        <a:t>0.68</a:t>
+                      </a:r>
+                    </a:p>
+                  </a:txBody>
+                  <a:tcPr/>
+                </a:tc>
+                <a:tc>
+                  <a:txBody>
+                    <a:bodyPr/>
+                    <a:lstStyle/>
+                    <a:p>
+                      <a:r>
+                        <a:rPr lang="en-US" dirty="0"/>
+                        <a:t>0.28</a:t>
+                      </a:r>
+                    </a:p>
+                  </a:txBody>
+                  <a:tcPr/>
+                </a:tc>
+                <a:extLst>
+                  <a:ext uri="{0D108BD9-81ED-4DB2-BD59-A6C34878D82A}">
+                    <a16:rowId xmlns:a16="http://schemas.microsoft.com/office/drawing/2014/main" val="1607444636"/>
+                  </a:ext>
+                </a:extLst>
+              </a:tr>
+              <a:tr h="490915">
+                <a:tc>
+                  <a:txBody>
+                    <a:bodyPr/>
+                    <a:lstStyle/>
+                    <a:p>
+                      <a:pPr algn="ctr"/>
+                      <a:r>
+                        <a:rPr lang="en-US" dirty="0"/>
+                        <a:t>Remove Education Factors</a:t>
+                      </a:r>
+                    </a:p>
+                  </a:txBody>
+                  <a:tcPr/>
+                </a:tc>
+                <a:tc>
+                  <a:txBody>
+                    <a:bodyPr/>
+                    <a:lstStyle/>
+                    <a:p>
+                      <a:pPr algn="ctr"/>
+                      <a:r>
+                        <a:rPr lang="en-US" dirty="0"/>
+                        <a:t>0.67</a:t>
+                      </a:r>
+                    </a:p>
+                  </a:txBody>
+                  <a:tcPr/>
+                </a:tc>
+                <a:tc>
+                  <a:txBody>
+                    <a:bodyPr/>
+                    <a:lstStyle/>
+                    <a:p>
+                      <a:r>
+                        <a:rPr lang="en-US" dirty="0"/>
+                        <a:t>0.28</a:t>
+                      </a:r>
+                    </a:p>
+                  </a:txBody>
+                  <a:tcPr/>
+                </a:tc>
+                <a:extLst>
+                  <a:ext uri="{0D108BD9-81ED-4DB2-BD59-A6C34878D82A}">
+                    <a16:rowId xmlns:a16="http://schemas.microsoft.com/office/drawing/2014/main" val="799581407"/>
+                  </a:ext>
+                </a:extLst>
+              </a:tr>
+              <a:tr h="490915">
+                <a:tc>
+                  <a:txBody>
+                    <a:bodyPr/>
+                    <a:lstStyle/>
+                    <a:p>
+                      <a:pPr algn="ctr"/>
+                      <a:r>
+                        <a:rPr lang="en-US" dirty="0"/>
+                        <a:t>Remove Race Factors</a:t>
+                      </a:r>
+                    </a:p>
+                  </a:txBody>
+                  <a:tcPr/>
+                </a:tc>
+                <a:tc>
+                  <a:txBody>
+                    <a:bodyPr/>
+                    <a:lstStyle/>
+                    <a:p>
+                      <a:pPr algn="ctr"/>
+                      <a:r>
+                        <a:rPr lang="en-US" dirty="0"/>
+                        <a:t>0.65</a:t>
+                      </a:r>
+                    </a:p>
+                  </a:txBody>
+                  <a:tcPr/>
+                </a:tc>
+                <a:tc>
+                  <a:txBody>
+                    <a:bodyPr/>
+                    <a:lstStyle/>
+                    <a:p>
+                      <a:r>
+                        <a:rPr lang="en-US" dirty="0"/>
+                        <a:t>0.30</a:t>
+                      </a:r>
+                    </a:p>
+                  </a:txBody>
+                  <a:tcPr/>
+                </a:tc>
+                <a:extLst>
+                  <a:ext uri="{0D108BD9-81ED-4DB2-BD59-A6C34878D82A}">
+                    <a16:rowId xmlns:a16="http://schemas.microsoft.com/office/drawing/2014/main" val="1908867058"/>
+                  </a:ext>
+                </a:extLst>
+              </a:tr>
+              <a:tr h="490915">
+                <a:tc>
+                  <a:txBody>
+                    <a:bodyPr/>
+                    <a:lstStyle/>
+                    <a:p>
+                      <a:pPr algn="ctr"/>
+                      <a:r>
+                        <a:rPr lang="en-US" dirty="0"/>
+                        <a:t>Remove Health Factors</a:t>
+                      </a:r>
+                    </a:p>
+                  </a:txBody>
+                  <a:tcPr/>
+                </a:tc>
+                <a:tc>
+                  <a:txBody>
+                    <a:bodyPr/>
+                    <a:lstStyle/>
+                    <a:p>
+                      <a:pPr algn="ctr"/>
+                      <a:r>
+                        <a:rPr lang="en-US" dirty="0"/>
+                        <a:t>0.65</a:t>
+                      </a:r>
+                    </a:p>
+                  </a:txBody>
+                  <a:tcPr/>
+                </a:tc>
+                <a:tc>
+                  <a:txBody>
+                    <a:bodyPr/>
+                    <a:lstStyle/>
+                    <a:p>
+                      <a:r>
+                        <a:rPr lang="en-US" dirty="0"/>
+                        <a:t>0.30</a:t>
+                      </a:r>
+                    </a:p>
+                  </a:txBody>
+                  <a:tcPr/>
+                </a:tc>
+                <a:extLst>
+                  <a:ext uri="{0D108BD9-81ED-4DB2-BD59-A6C34878D82A}">
+                    <a16:rowId xmlns:a16="http://schemas.microsoft.com/office/drawing/2014/main" val="2368818877"/>
+                  </a:ext>
+                </a:extLst>
+              </a:tr>
+              <a:tr h="490915">
+                <a:tc>
+                  <a:txBody>
+                    <a:bodyPr/>
+                    <a:lstStyle/>
+                    <a:p>
+                      <a:pPr algn="ctr"/>
+                      <a:r>
+                        <a:rPr lang="en-US" dirty="0"/>
+                        <a:t>Remove Income Factors</a:t>
+                      </a:r>
+                    </a:p>
+                  </a:txBody>
+                  <a:tcPr/>
+                </a:tc>
+                <a:tc>
+                  <a:txBody>
+                    <a:bodyPr/>
+                    <a:lstStyle/>
+                    <a:p>
+                      <a:pPr algn="ctr"/>
+                      <a:r>
+                        <a:rPr lang="en-US" dirty="0"/>
+                        <a:t>0.63</a:t>
+                      </a:r>
+                    </a:p>
+                  </a:txBody>
+                  <a:tcPr/>
+                </a:tc>
+                <a:tc>
+                  <a:txBody>
+                    <a:bodyPr/>
+                    <a:lstStyle/>
+                    <a:p>
+                      <a:r>
+                        <a:rPr lang="en-US" dirty="0"/>
+                        <a:t>0.32</a:t>
+                      </a:r>
+                    </a:p>
+                  </a:txBody>
+                  <a:tcPr/>
+                </a:tc>
+                <a:extLst>
+                  <a:ext uri="{0D108BD9-81ED-4DB2-BD59-A6C34878D82A}">
+                    <a16:rowId xmlns:a16="http://schemas.microsoft.com/office/drawing/2014/main" val="950817438"/>
+                  </a:ext>
+                </a:extLst>
+              </a:tr>
+              <a:tr h="490915">
+                <a:tc>
+                  <a:txBody>
+                    <a:bodyPr/>
+                    <a:lstStyle/>
+                    <a:p>
+                      <a:pPr algn="ctr"/>
+                      <a:r>
+                        <a:rPr lang="en-US" dirty="0"/>
+                        <a:t>Income, Smoking, Diabetes</a:t>
+                      </a:r>
+                    </a:p>
+                  </a:txBody>
+                  <a:tcPr/>
+                </a:tc>
+                <a:tc>
+                  <a:txBody>
+                    <a:bodyPr/>
+                    <a:lstStyle/>
+                    <a:p>
+                      <a:pPr algn="ctr"/>
+                      <a:r>
+                        <a:rPr lang="en-US" dirty="0"/>
+                        <a:t>0.65</a:t>
+                      </a:r>
+                    </a:p>
+                  </a:txBody>
+                  <a:tcPr/>
+                </a:tc>
+                <a:tc>
+                  <a:txBody>
+                    <a:bodyPr/>
+                    <a:lstStyle/>
+                    <a:p>
+                      <a:r>
+                        <a:rPr lang="en-US" dirty="0"/>
+                        <a:t>0.31</a:t>
+                      </a:r>
+                    </a:p>
+                  </a:txBody>
+                  <a:tcPr/>
+                </a:tc>
+                <a:extLst>
+                  <a:ext uri="{0D108BD9-81ED-4DB2-BD59-A6C34878D82A}">
+                    <a16:rowId xmlns:a16="http://schemas.microsoft.com/office/drawing/2014/main" val="560964654"/>
+                  </a:ext>
+                </a:extLst>
+              </a:tr>
+              <a:tr h="537811">
+                <a:tc>
+                  <a:txBody>
+                    <a:bodyPr/>
+                    <a:lstStyle/>
+                    <a:p>
+                      <a:pPr algn="ctr"/>
+                      <a:r>
+                        <a:rPr lang="en-US" dirty="0"/>
+                        <a:t>Income and Education </a:t>
+                      </a:r>
+                    </a:p>
+                    <a:p>
+                      <a:pPr algn="ctr"/>
+                      <a:r>
+                        <a:rPr lang="en-US" dirty="0"/>
+                        <a:t>(Project 1 Variables)</a:t>
+                      </a:r>
+                    </a:p>
+                  </a:txBody>
+                  <a:tcPr/>
+                </a:tc>
+                <a:tc>
+                  <a:txBody>
+                    <a:bodyPr/>
+                    <a:lstStyle/>
+                    <a:p>
+                      <a:pPr algn="ctr"/>
+                      <a:r>
+                        <a:rPr lang="en-US" dirty="0"/>
+                        <a:t>0.50</a:t>
+                      </a:r>
+                    </a:p>
+                  </a:txBody>
+                  <a:tcPr/>
+                </a:tc>
+                <a:tc>
+                  <a:txBody>
+                    <a:bodyPr/>
+                    <a:lstStyle/>
+                    <a:p>
+                      <a:r>
+                        <a:rPr lang="en-US" dirty="0"/>
+                        <a:t>0.45</a:t>
+                      </a:r>
+                    </a:p>
+                  </a:txBody>
+                  <a:tcPr/>
+                </a:tc>
+                <a:extLst>
+                  <a:ext uri="{0D108BD9-81ED-4DB2-BD59-A6C34878D82A}">
+                    <a16:rowId xmlns:a16="http://schemas.microsoft.com/office/drawing/2014/main" val="876473728"/>
+                  </a:ext>
+                </a:extLst>
+              </a:tr>
+            </a:tbl>
+          </a:graphicData>
+        </a:graphic>
+      </p:graphicFrame>
+    </p:spTree>
+    <p:extLst>
+      <p:ext uri="{BB962C8B-B14F-4D97-AF65-F5344CB8AC3E}">
+        <p14:creationId xmlns:p14="http://schemas.microsoft.com/office/powerpoint/2010/main" val="1462469876"/>
+      </p:ext>
+    </p:extLst>
+  </p:cSld>
+  <p:clrMapOvr>
+    <a:masterClrMapping/>
+  </p:clrMapOvr>
+</p:sld>
+</file>
+
 <file path=ppt/slides/slide2.xml><?xml version="1.0" encoding="utf-8"?>
 <p:sld xmlns:a="http://schemas.openxmlformats.org/drawingml/2006/main" xmlns:r="http://schemas.openxmlformats.org/officeDocument/2006/relationships" xmlns:p="http://schemas.openxmlformats.org/presentationml/2006/main">
   <p:cSld>
@@ -7699,8 +9811,44 @@
         </p:blipFill>
         <p:spPr>
           <a:xfrm>
-            <a:off x="4715617" y="2556769"/>
+            <a:off x="4769223" y="3710868"/>
             <a:ext cx="7175259" cy="1615736"/>
+          </a:xfrm>
+          <a:prstGeom prst="rect">
+            <a:avLst/>
+          </a:prstGeom>
+        </p:spPr>
+      </p:pic>
+      <p:pic>
+        <p:nvPicPr>
+          <p:cNvPr id="5" name="Picture 4">
+            <a:extLst>
+              <a:ext uri="{FF2B5EF4-FFF2-40B4-BE49-F238E27FC236}">
+                <a16:creationId xmlns:a16="http://schemas.microsoft.com/office/drawing/2014/main" id="{5F5FB817-E71C-4224-8799-1D0F72B48512}"/>
+              </a:ext>
+            </a:extLst>
+          </p:cNvPr>
+          <p:cNvPicPr>
+            <a:picLocks noChangeAspect="1"/>
+          </p:cNvPicPr>
+          <p:nvPr/>
+        </p:nvPicPr>
+        <p:blipFill>
+          <a:blip r:embed="rId3">
+            <a:extLst>
+              <a:ext uri="{28A0092B-C50C-407E-A947-70E740481C1C}">
+                <a14:useLocalDpi xmlns:a14="http://schemas.microsoft.com/office/drawing/2010/main" val="0"/>
+              </a:ext>
+            </a:extLst>
+          </a:blip>
+          <a:stretch>
+            <a:fillRect/>
+          </a:stretch>
+        </p:blipFill>
+        <p:spPr>
+          <a:xfrm>
+            <a:off x="4769223" y="858138"/>
+            <a:ext cx="7121654" cy="2364457"/>
           </a:xfrm>
           <a:prstGeom prst="rect">
             <a:avLst/>

</xml_diff>